<commit_message>
improved Figure 2 resolution and title size
</commit_message>
<xml_diff>
--- a/fig2/haiku_ppt.pptx
+++ b/fig2/haiku_ppt.pptx
@@ -107,6 +107,11 @@
       </a:defRPr>
     </a:lvl9pPr>
   </p:defaultTextStyle>
+  <p:extLst>
+    <p:ext uri="{EFAFB233-063F-42B5-8137-9DF3F51BA10A}">
+      <p15:sldGuideLst xmlns:p15="http://schemas.microsoft.com/office/powerpoint/2012/main"/>
+    </p:ext>
+  </p:extLst>
 </p:presentation>
 </file>
 
@@ -192,7 +197,7 @@
           <a:p>
             <a:fld id="{B03152D7-02D7-E847-92C2-4A40D7E05EAF}" type="datetimeFigureOut">
               <a:rPr lang="en-US" smtClean="0"/>
-              <a:t>5/6/23</a:t>
+              <a:t>8/23/23</a:t>
             </a:fld>
             <a:endParaRPr lang="en-US"/>
           </a:p>
@@ -693,7 +698,7 @@
           <a:p>
             <a:fld id="{4391C680-B2F7-3F43-8AC8-388B4D3266FB}" type="datetimeFigureOut">
               <a:rPr lang="en-US" smtClean="0"/>
-              <a:t>5/6/23</a:t>
+              <a:t>8/23/23</a:t>
             </a:fld>
             <a:endParaRPr lang="en-US"/>
           </a:p>
@@ -891,7 +896,7 @@
           <a:p>
             <a:fld id="{4391C680-B2F7-3F43-8AC8-388B4D3266FB}" type="datetimeFigureOut">
               <a:rPr lang="en-US" smtClean="0"/>
-              <a:t>5/6/23</a:t>
+              <a:t>8/23/23</a:t>
             </a:fld>
             <a:endParaRPr lang="en-US"/>
           </a:p>
@@ -1099,7 +1104,7 @@
           <a:p>
             <a:fld id="{4391C680-B2F7-3F43-8AC8-388B4D3266FB}" type="datetimeFigureOut">
               <a:rPr lang="en-US" smtClean="0"/>
-              <a:t>5/6/23</a:t>
+              <a:t>8/23/23</a:t>
             </a:fld>
             <a:endParaRPr lang="en-US"/>
           </a:p>
@@ -1297,7 +1302,7 @@
           <a:p>
             <a:fld id="{4391C680-B2F7-3F43-8AC8-388B4D3266FB}" type="datetimeFigureOut">
               <a:rPr lang="en-US" smtClean="0"/>
-              <a:t>5/6/23</a:t>
+              <a:t>8/23/23</a:t>
             </a:fld>
             <a:endParaRPr lang="en-US"/>
           </a:p>
@@ -1572,7 +1577,7 @@
           <a:p>
             <a:fld id="{4391C680-B2F7-3F43-8AC8-388B4D3266FB}" type="datetimeFigureOut">
               <a:rPr lang="en-US" smtClean="0"/>
-              <a:t>5/6/23</a:t>
+              <a:t>8/23/23</a:t>
             </a:fld>
             <a:endParaRPr lang="en-US"/>
           </a:p>
@@ -1837,7 +1842,7 @@
           <a:p>
             <a:fld id="{4391C680-B2F7-3F43-8AC8-388B4D3266FB}" type="datetimeFigureOut">
               <a:rPr lang="en-US" smtClean="0"/>
-              <a:t>5/6/23</a:t>
+              <a:t>8/23/23</a:t>
             </a:fld>
             <a:endParaRPr lang="en-US"/>
           </a:p>
@@ -2249,7 +2254,7 @@
           <a:p>
             <a:fld id="{4391C680-B2F7-3F43-8AC8-388B4D3266FB}" type="datetimeFigureOut">
               <a:rPr lang="en-US" smtClean="0"/>
-              <a:t>5/6/23</a:t>
+              <a:t>8/23/23</a:t>
             </a:fld>
             <a:endParaRPr lang="en-US"/>
           </a:p>
@@ -2390,7 +2395,7 @@
           <a:p>
             <a:fld id="{4391C680-B2F7-3F43-8AC8-388B4D3266FB}" type="datetimeFigureOut">
               <a:rPr lang="en-US" smtClean="0"/>
-              <a:t>5/6/23</a:t>
+              <a:t>8/23/23</a:t>
             </a:fld>
             <a:endParaRPr lang="en-US"/>
           </a:p>
@@ -2503,7 +2508,7 @@
           <a:p>
             <a:fld id="{4391C680-B2F7-3F43-8AC8-388B4D3266FB}" type="datetimeFigureOut">
               <a:rPr lang="en-US" smtClean="0"/>
-              <a:t>5/6/23</a:t>
+              <a:t>8/23/23</a:t>
             </a:fld>
             <a:endParaRPr lang="en-US"/>
           </a:p>
@@ -2814,7 +2819,7 @@
           <a:p>
             <a:fld id="{4391C680-B2F7-3F43-8AC8-388B4D3266FB}" type="datetimeFigureOut">
               <a:rPr lang="en-US" smtClean="0"/>
-              <a:t>5/6/23</a:t>
+              <a:t>8/23/23</a:t>
             </a:fld>
             <a:endParaRPr lang="en-US"/>
           </a:p>
@@ -3102,7 +3107,7 @@
           <a:p>
             <a:fld id="{4391C680-B2F7-3F43-8AC8-388B4D3266FB}" type="datetimeFigureOut">
               <a:rPr lang="en-US" smtClean="0"/>
-              <a:t>5/6/23</a:t>
+              <a:t>8/23/23</a:t>
             </a:fld>
             <a:endParaRPr lang="en-US"/>
           </a:p>
@@ -3343,7 +3348,7 @@
           <a:p>
             <a:fld id="{4391C680-B2F7-3F43-8AC8-388B4D3266FB}" type="datetimeFigureOut">
               <a:rPr lang="en-US" smtClean="0"/>
-              <a:t>5/6/23</a:t>
+              <a:t>8/23/23</a:t>
             </a:fld>
             <a:endParaRPr lang="en-US"/>
           </a:p>
@@ -3781,8 +3786,8 @@
         </p:blipFill>
         <p:spPr>
           <a:xfrm>
-            <a:off x="1357319" y="328612"/>
-            <a:ext cx="8986837" cy="6200775"/>
+            <a:off x="1271751" y="852522"/>
+            <a:ext cx="8168515" cy="5636146"/>
           </a:xfrm>
           <a:prstGeom prst="rect">
             <a:avLst/>
@@ -3805,8 +3810,8 @@
         </p:nvSpPr>
         <p:spPr>
           <a:xfrm>
-            <a:off x="661993" y="-163513"/>
-            <a:ext cx="10515600" cy="506413"/>
+            <a:off x="352426" y="141287"/>
+            <a:ext cx="10710200" cy="857196"/>
           </a:xfrm>
           <a:prstGeom prst="rect">
             <a:avLst/>
@@ -3814,7 +3819,7 @@
         </p:spPr>
         <p:txBody>
           <a:bodyPr vert="horz" lIns="91440" tIns="45720" rIns="91440" bIns="45720" rtlCol="0" anchor="b">
-            <a:normAutofit/>
+            <a:noAutofit/>
           </a:bodyPr>
           <a:lstStyle>
             <a:lvl1pPr algn="ctr" defTabSz="914400" rtl="0" eaLnBrk="1" latinLnBrk="0" hangingPunct="1">
@@ -3837,7 +3842,7 @@
           </a:lstStyle>
           <a:p>
             <a:r>
-              <a:rPr lang="en-US" sz="2000" b="1" dirty="0"/>
+              <a:rPr lang="en-US" sz="3600" b="1" dirty="0"/>
               <a:t>Figure 2: The Great Escape - Californian Net Migration in in the Late 1950's and Late 1990's</a:t>
             </a:r>
           </a:p>
@@ -3904,8 +3909,8 @@
         </p:nvSpPr>
         <p:spPr>
           <a:xfrm>
-            <a:off x="676280" y="328611"/>
-            <a:ext cx="10515600" cy="6200776"/>
+            <a:off x="532578" y="852522"/>
+            <a:ext cx="9646859" cy="5636146"/>
           </a:xfrm>
           <a:prstGeom prst="rect">
             <a:avLst/>

</xml_diff>